<commit_message>
update DG with enhancements
</commit_message>
<xml_diff>
--- a/docs/diagrams/ModelComponentClassDiagram.pptx
+++ b/docs/diagrams/ModelComponentClassDiagram.pptx
@@ -208,7 +208,7 @@
           <a:p>
             <a:fld id="{F5CC4B3F-88C1-4FFA-B1B6-F41C21DC6924}" type="datetimeFigureOut">
               <a:rPr lang="en-US" smtClean="0"/>
-              <a:t>1/1/18</a:t>
+              <a:t>4/14/2018</a:t>
             </a:fld>
             <a:endParaRPr lang="en-US"/>
           </a:p>
@@ -272,38 +272,37 @@
           <a:p>
             <a:pPr lvl="0"/>
             <a:r>
-              <a:rPr lang="en-US" smtClean="0"/>
+              <a:rPr lang="en-US"/>
               <a:t>Click to edit Master text styles</a:t>
             </a:r>
           </a:p>
           <a:p>
             <a:pPr lvl="1"/>
             <a:r>
-              <a:rPr lang="en-US" smtClean="0"/>
+              <a:rPr lang="en-US"/>
               <a:t>Second level</a:t>
             </a:r>
           </a:p>
           <a:p>
             <a:pPr lvl="2"/>
             <a:r>
-              <a:rPr lang="en-US" smtClean="0"/>
+              <a:rPr lang="en-US"/>
               <a:t>Third level</a:t>
             </a:r>
           </a:p>
           <a:p>
             <a:pPr lvl="3"/>
             <a:r>
-              <a:rPr lang="en-US" smtClean="0"/>
+              <a:rPr lang="en-US"/>
               <a:t>Fourth level</a:t>
             </a:r>
           </a:p>
           <a:p>
             <a:pPr lvl="4"/>
             <a:r>
-              <a:rPr lang="en-US" smtClean="0"/>
+              <a:rPr lang="en-US"/>
               <a:t>Fifth level</a:t>
             </a:r>
-            <a:endParaRPr lang="en-US"/>
           </a:p>
         </p:txBody>
       </p:sp>
@@ -514,10 +513,9 @@
           <a:lstStyle/>
           <a:p>
             <a:r>
-              <a:rPr lang="en-US" smtClean="0"/>
+              <a:rPr lang="en-US"/>
               <a:t>Click to edit Master title style</a:t>
             </a:r>
-            <a:endParaRPr lang="en-US"/>
           </a:p>
         </p:txBody>
       </p:sp>
@@ -633,10 +631,9 @@
           </a:lstStyle>
           <a:p>
             <a:r>
-              <a:rPr lang="en-US" smtClean="0"/>
+              <a:rPr lang="en-US"/>
               <a:t>Click to edit Master subtitle style</a:t>
             </a:r>
-            <a:endParaRPr lang="en-US"/>
           </a:p>
         </p:txBody>
       </p:sp>
@@ -657,7 +654,7 @@
           <a:p>
             <a:fld id="{78C97017-6FC3-485B-9764-EAC9E56C1D49}" type="datetimeFigureOut">
               <a:rPr lang="en-US" smtClean="0"/>
-              <a:t>1/1/18</a:t>
+              <a:t>4/14/2018</a:t>
             </a:fld>
             <a:endParaRPr lang="en-US"/>
           </a:p>
@@ -751,10 +748,9 @@
           <a:lstStyle/>
           <a:p>
             <a:r>
-              <a:rPr lang="en-US" smtClean="0"/>
+              <a:rPr lang="en-US"/>
               <a:t>Click to edit Master title style</a:t>
             </a:r>
-            <a:endParaRPr lang="en-US"/>
           </a:p>
         </p:txBody>
       </p:sp>
@@ -775,38 +771,37 @@
           <a:p>
             <a:pPr lvl="0"/>
             <a:r>
-              <a:rPr lang="en-US" smtClean="0"/>
+              <a:rPr lang="en-US"/>
               <a:t>Click to edit Master text styles</a:t>
             </a:r>
           </a:p>
           <a:p>
             <a:pPr lvl="1"/>
             <a:r>
-              <a:rPr lang="en-US" smtClean="0"/>
+              <a:rPr lang="en-US"/>
               <a:t>Second level</a:t>
             </a:r>
           </a:p>
           <a:p>
             <a:pPr lvl="2"/>
             <a:r>
-              <a:rPr lang="en-US" smtClean="0"/>
+              <a:rPr lang="en-US"/>
               <a:t>Third level</a:t>
             </a:r>
           </a:p>
           <a:p>
             <a:pPr lvl="3"/>
             <a:r>
-              <a:rPr lang="en-US" smtClean="0"/>
+              <a:rPr lang="en-US"/>
               <a:t>Fourth level</a:t>
             </a:r>
           </a:p>
           <a:p>
             <a:pPr lvl="4"/>
             <a:r>
-              <a:rPr lang="en-US" smtClean="0"/>
+              <a:rPr lang="en-US"/>
               <a:t>Fifth level</a:t>
             </a:r>
-            <a:endParaRPr lang="en-US"/>
           </a:p>
         </p:txBody>
       </p:sp>
@@ -827,7 +822,7 @@
           <a:p>
             <a:fld id="{78C97017-6FC3-485B-9764-EAC9E56C1D49}" type="datetimeFigureOut">
               <a:rPr lang="en-US" smtClean="0"/>
-              <a:t>1/1/18</a:t>
+              <a:t>4/14/2018</a:t>
             </a:fld>
             <a:endParaRPr lang="en-US"/>
           </a:p>
@@ -926,10 +921,9 @@
           <a:lstStyle/>
           <a:p>
             <a:r>
-              <a:rPr lang="en-US" smtClean="0"/>
+              <a:rPr lang="en-US"/>
               <a:t>Click to edit Master title style</a:t>
             </a:r>
-            <a:endParaRPr lang="en-US"/>
           </a:p>
         </p:txBody>
       </p:sp>
@@ -955,38 +949,37 @@
           <a:p>
             <a:pPr lvl="0"/>
             <a:r>
-              <a:rPr lang="en-US" smtClean="0"/>
+              <a:rPr lang="en-US"/>
               <a:t>Click to edit Master text styles</a:t>
             </a:r>
           </a:p>
           <a:p>
             <a:pPr lvl="1"/>
             <a:r>
-              <a:rPr lang="en-US" smtClean="0"/>
+              <a:rPr lang="en-US"/>
               <a:t>Second level</a:t>
             </a:r>
           </a:p>
           <a:p>
             <a:pPr lvl="2"/>
             <a:r>
-              <a:rPr lang="en-US" smtClean="0"/>
+              <a:rPr lang="en-US"/>
               <a:t>Third level</a:t>
             </a:r>
           </a:p>
           <a:p>
             <a:pPr lvl="3"/>
             <a:r>
-              <a:rPr lang="en-US" smtClean="0"/>
+              <a:rPr lang="en-US"/>
               <a:t>Fourth level</a:t>
             </a:r>
           </a:p>
           <a:p>
             <a:pPr lvl="4"/>
             <a:r>
-              <a:rPr lang="en-US" smtClean="0"/>
+              <a:rPr lang="en-US"/>
               <a:t>Fifth level</a:t>
             </a:r>
-            <a:endParaRPr lang="en-US"/>
           </a:p>
         </p:txBody>
       </p:sp>
@@ -1007,7 +1000,7 @@
           <a:p>
             <a:fld id="{78C97017-6FC3-485B-9764-EAC9E56C1D49}" type="datetimeFigureOut">
               <a:rPr lang="en-US" smtClean="0"/>
-              <a:t>1/1/18</a:t>
+              <a:t>4/14/2018</a:t>
             </a:fld>
             <a:endParaRPr lang="en-US"/>
           </a:p>
@@ -1101,10 +1094,9 @@
           <a:lstStyle/>
           <a:p>
             <a:r>
-              <a:rPr lang="en-US" smtClean="0"/>
+              <a:rPr lang="en-US"/>
               <a:t>Click to edit Master title style</a:t>
             </a:r>
-            <a:endParaRPr lang="en-US"/>
           </a:p>
         </p:txBody>
       </p:sp>
@@ -1125,38 +1117,37 @@
           <a:p>
             <a:pPr lvl="0"/>
             <a:r>
-              <a:rPr lang="en-US" smtClean="0"/>
+              <a:rPr lang="en-US"/>
               <a:t>Click to edit Master text styles</a:t>
             </a:r>
           </a:p>
           <a:p>
             <a:pPr lvl="1"/>
             <a:r>
-              <a:rPr lang="en-US" smtClean="0"/>
+              <a:rPr lang="en-US"/>
               <a:t>Second level</a:t>
             </a:r>
           </a:p>
           <a:p>
             <a:pPr lvl="2"/>
             <a:r>
-              <a:rPr lang="en-US" smtClean="0"/>
+              <a:rPr lang="en-US"/>
               <a:t>Third level</a:t>
             </a:r>
           </a:p>
           <a:p>
             <a:pPr lvl="3"/>
             <a:r>
-              <a:rPr lang="en-US" smtClean="0"/>
+              <a:rPr lang="en-US"/>
               <a:t>Fourth level</a:t>
             </a:r>
           </a:p>
           <a:p>
             <a:pPr lvl="4"/>
             <a:r>
-              <a:rPr lang="en-US" smtClean="0"/>
+              <a:rPr lang="en-US"/>
               <a:t>Fifth level</a:t>
             </a:r>
-            <a:endParaRPr lang="en-US"/>
           </a:p>
         </p:txBody>
       </p:sp>
@@ -1177,7 +1168,7 @@
           <a:p>
             <a:fld id="{78C97017-6FC3-485B-9764-EAC9E56C1D49}" type="datetimeFigureOut">
               <a:rPr lang="en-US" smtClean="0"/>
-              <a:t>1/1/18</a:t>
+              <a:t>4/14/2018</a:t>
             </a:fld>
             <a:endParaRPr lang="en-US"/>
           </a:p>
@@ -1280,10 +1271,9 @@
           </a:lstStyle>
           <a:p>
             <a:r>
-              <a:rPr lang="en-US" smtClean="0"/>
+              <a:rPr lang="en-US"/>
               <a:t>Click to edit Master title style</a:t>
             </a:r>
-            <a:endParaRPr lang="en-US"/>
           </a:p>
         </p:txBody>
       </p:sp>
@@ -1400,7 +1390,7 @@
           <a:p>
             <a:pPr lvl="0"/>
             <a:r>
-              <a:rPr lang="en-US" smtClean="0"/>
+              <a:rPr lang="en-US"/>
               <a:t>Click to edit Master text styles</a:t>
             </a:r>
           </a:p>
@@ -1423,7 +1413,7 @@
           <a:p>
             <a:fld id="{78C97017-6FC3-485B-9764-EAC9E56C1D49}" type="datetimeFigureOut">
               <a:rPr lang="en-US" smtClean="0"/>
-              <a:t>1/1/18</a:t>
+              <a:t>4/14/2018</a:t>
             </a:fld>
             <a:endParaRPr lang="en-US"/>
           </a:p>
@@ -1517,10 +1507,9 @@
           <a:lstStyle/>
           <a:p>
             <a:r>
-              <a:rPr lang="en-US" smtClean="0"/>
+              <a:rPr lang="en-US"/>
               <a:t>Click to edit Master title style</a:t>
             </a:r>
-            <a:endParaRPr lang="en-US"/>
           </a:p>
         </p:txBody>
       </p:sp>
@@ -1574,38 +1563,37 @@
           <a:p>
             <a:pPr lvl="0"/>
             <a:r>
-              <a:rPr lang="en-US" smtClean="0"/>
+              <a:rPr lang="en-US"/>
               <a:t>Click to edit Master text styles</a:t>
             </a:r>
           </a:p>
           <a:p>
             <a:pPr lvl="1"/>
             <a:r>
-              <a:rPr lang="en-US" smtClean="0"/>
+              <a:rPr lang="en-US"/>
               <a:t>Second level</a:t>
             </a:r>
           </a:p>
           <a:p>
             <a:pPr lvl="2"/>
             <a:r>
-              <a:rPr lang="en-US" smtClean="0"/>
+              <a:rPr lang="en-US"/>
               <a:t>Third level</a:t>
             </a:r>
           </a:p>
           <a:p>
             <a:pPr lvl="3"/>
             <a:r>
-              <a:rPr lang="en-US" smtClean="0"/>
+              <a:rPr lang="en-US"/>
               <a:t>Fourth level</a:t>
             </a:r>
           </a:p>
           <a:p>
             <a:pPr lvl="4"/>
             <a:r>
-              <a:rPr lang="en-US" smtClean="0"/>
+              <a:rPr lang="en-US"/>
               <a:t>Fifth level</a:t>
             </a:r>
-            <a:endParaRPr lang="en-US"/>
           </a:p>
         </p:txBody>
       </p:sp>
@@ -1659,38 +1647,37 @@
           <a:p>
             <a:pPr lvl="0"/>
             <a:r>
-              <a:rPr lang="en-US" smtClean="0"/>
+              <a:rPr lang="en-US"/>
               <a:t>Click to edit Master text styles</a:t>
             </a:r>
           </a:p>
           <a:p>
             <a:pPr lvl="1"/>
             <a:r>
-              <a:rPr lang="en-US" smtClean="0"/>
+              <a:rPr lang="en-US"/>
               <a:t>Second level</a:t>
             </a:r>
           </a:p>
           <a:p>
             <a:pPr lvl="2"/>
             <a:r>
-              <a:rPr lang="en-US" smtClean="0"/>
+              <a:rPr lang="en-US"/>
               <a:t>Third level</a:t>
             </a:r>
           </a:p>
           <a:p>
             <a:pPr lvl="3"/>
             <a:r>
-              <a:rPr lang="en-US" smtClean="0"/>
+              <a:rPr lang="en-US"/>
               <a:t>Fourth level</a:t>
             </a:r>
           </a:p>
           <a:p>
             <a:pPr lvl="4"/>
             <a:r>
-              <a:rPr lang="en-US" smtClean="0"/>
+              <a:rPr lang="en-US"/>
               <a:t>Fifth level</a:t>
             </a:r>
-            <a:endParaRPr lang="en-US"/>
           </a:p>
         </p:txBody>
       </p:sp>
@@ -1711,7 +1698,7 @@
           <a:p>
             <a:fld id="{78C97017-6FC3-485B-9764-EAC9E56C1D49}" type="datetimeFigureOut">
               <a:rPr lang="en-US" smtClean="0"/>
-              <a:t>1/1/18</a:t>
+              <a:t>4/14/2018</a:t>
             </a:fld>
             <a:endParaRPr lang="en-US"/>
           </a:p>
@@ -1809,10 +1796,9 @@
           </a:lstStyle>
           <a:p>
             <a:r>
-              <a:rPr lang="en-US" smtClean="0"/>
+              <a:rPr lang="en-US"/>
               <a:t>Click to edit Master title style</a:t>
             </a:r>
-            <a:endParaRPr lang="en-US"/>
           </a:p>
         </p:txBody>
       </p:sp>
@@ -1875,7 +1861,7 @@
           <a:p>
             <a:pPr lvl="0"/>
             <a:r>
-              <a:rPr lang="en-US" smtClean="0"/>
+              <a:rPr lang="en-US"/>
               <a:t>Click to edit Master text styles</a:t>
             </a:r>
           </a:p>
@@ -1931,38 +1917,37 @@
           <a:p>
             <a:pPr lvl="0"/>
             <a:r>
-              <a:rPr lang="en-US" smtClean="0"/>
+              <a:rPr lang="en-US"/>
               <a:t>Click to edit Master text styles</a:t>
             </a:r>
           </a:p>
           <a:p>
             <a:pPr lvl="1"/>
             <a:r>
-              <a:rPr lang="en-US" smtClean="0"/>
+              <a:rPr lang="en-US"/>
               <a:t>Second level</a:t>
             </a:r>
           </a:p>
           <a:p>
             <a:pPr lvl="2"/>
             <a:r>
-              <a:rPr lang="en-US" smtClean="0"/>
+              <a:rPr lang="en-US"/>
               <a:t>Third level</a:t>
             </a:r>
           </a:p>
           <a:p>
             <a:pPr lvl="3"/>
             <a:r>
-              <a:rPr lang="en-US" smtClean="0"/>
+              <a:rPr lang="en-US"/>
               <a:t>Fourth level</a:t>
             </a:r>
           </a:p>
           <a:p>
             <a:pPr lvl="4"/>
             <a:r>
-              <a:rPr lang="en-US" smtClean="0"/>
+              <a:rPr lang="en-US"/>
               <a:t>Fifth level</a:t>
             </a:r>
-            <a:endParaRPr lang="en-US"/>
           </a:p>
         </p:txBody>
       </p:sp>
@@ -2025,7 +2010,7 @@
           <a:p>
             <a:pPr lvl="0"/>
             <a:r>
-              <a:rPr lang="en-US" smtClean="0"/>
+              <a:rPr lang="en-US"/>
               <a:t>Click to edit Master text styles</a:t>
             </a:r>
           </a:p>
@@ -2081,38 +2066,37 @@
           <a:p>
             <a:pPr lvl="0"/>
             <a:r>
-              <a:rPr lang="en-US" smtClean="0"/>
+              <a:rPr lang="en-US"/>
               <a:t>Click to edit Master text styles</a:t>
             </a:r>
           </a:p>
           <a:p>
             <a:pPr lvl="1"/>
             <a:r>
-              <a:rPr lang="en-US" smtClean="0"/>
+              <a:rPr lang="en-US"/>
               <a:t>Second level</a:t>
             </a:r>
           </a:p>
           <a:p>
             <a:pPr lvl="2"/>
             <a:r>
-              <a:rPr lang="en-US" smtClean="0"/>
+              <a:rPr lang="en-US"/>
               <a:t>Third level</a:t>
             </a:r>
           </a:p>
           <a:p>
             <a:pPr lvl="3"/>
             <a:r>
-              <a:rPr lang="en-US" smtClean="0"/>
+              <a:rPr lang="en-US"/>
               <a:t>Fourth level</a:t>
             </a:r>
           </a:p>
           <a:p>
             <a:pPr lvl="4"/>
             <a:r>
-              <a:rPr lang="en-US" smtClean="0"/>
+              <a:rPr lang="en-US"/>
               <a:t>Fifth level</a:t>
             </a:r>
-            <a:endParaRPr lang="en-US"/>
           </a:p>
         </p:txBody>
       </p:sp>
@@ -2133,7 +2117,7 @@
           <a:p>
             <a:fld id="{78C97017-6FC3-485B-9764-EAC9E56C1D49}" type="datetimeFigureOut">
               <a:rPr lang="en-US" smtClean="0"/>
-              <a:t>1/1/18</a:t>
+              <a:t>4/14/2018</a:t>
             </a:fld>
             <a:endParaRPr lang="en-US"/>
           </a:p>
@@ -2227,10 +2211,9 @@
           <a:lstStyle/>
           <a:p>
             <a:r>
-              <a:rPr lang="en-US" smtClean="0"/>
+              <a:rPr lang="en-US"/>
               <a:t>Click to edit Master title style</a:t>
             </a:r>
-            <a:endParaRPr lang="en-US"/>
           </a:p>
         </p:txBody>
       </p:sp>
@@ -2251,7 +2234,7 @@
           <a:p>
             <a:fld id="{78C97017-6FC3-485B-9764-EAC9E56C1D49}" type="datetimeFigureOut">
               <a:rPr lang="en-US" smtClean="0"/>
-              <a:t>1/1/18</a:t>
+              <a:t>4/14/2018</a:t>
             </a:fld>
             <a:endParaRPr lang="en-US"/>
           </a:p>
@@ -2346,7 +2329,7 @@
           <a:p>
             <a:fld id="{78C97017-6FC3-485B-9764-EAC9E56C1D49}" type="datetimeFigureOut">
               <a:rPr lang="en-US" smtClean="0"/>
-              <a:t>1/1/18</a:t>
+              <a:t>4/14/2018</a:t>
             </a:fld>
             <a:endParaRPr lang="en-US"/>
           </a:p>
@@ -2449,10 +2432,9 @@
           </a:lstStyle>
           <a:p>
             <a:r>
-              <a:rPr lang="en-US" smtClean="0"/>
+              <a:rPr lang="en-US"/>
               <a:t>Click to edit Master title style</a:t>
             </a:r>
-            <a:endParaRPr lang="en-US"/>
           </a:p>
         </p:txBody>
       </p:sp>
@@ -2506,38 +2488,37 @@
           <a:p>
             <a:pPr lvl="0"/>
             <a:r>
-              <a:rPr lang="en-US" smtClean="0"/>
+              <a:rPr lang="en-US"/>
               <a:t>Click to edit Master text styles</a:t>
             </a:r>
           </a:p>
           <a:p>
             <a:pPr lvl="1"/>
             <a:r>
-              <a:rPr lang="en-US" smtClean="0"/>
+              <a:rPr lang="en-US"/>
               <a:t>Second level</a:t>
             </a:r>
           </a:p>
           <a:p>
             <a:pPr lvl="2"/>
             <a:r>
-              <a:rPr lang="en-US" smtClean="0"/>
+              <a:rPr lang="en-US"/>
               <a:t>Third level</a:t>
             </a:r>
           </a:p>
           <a:p>
             <a:pPr lvl="3"/>
             <a:r>
-              <a:rPr lang="en-US" smtClean="0"/>
+              <a:rPr lang="en-US"/>
               <a:t>Fourth level</a:t>
             </a:r>
           </a:p>
           <a:p>
             <a:pPr lvl="4"/>
             <a:r>
-              <a:rPr lang="en-US" smtClean="0"/>
+              <a:rPr lang="en-US"/>
               <a:t>Fifth level</a:t>
             </a:r>
-            <a:endParaRPr lang="en-US"/>
           </a:p>
         </p:txBody>
       </p:sp>
@@ -2600,7 +2581,7 @@
           <a:p>
             <a:pPr lvl="0"/>
             <a:r>
-              <a:rPr lang="en-US" smtClean="0"/>
+              <a:rPr lang="en-US"/>
               <a:t>Click to edit Master text styles</a:t>
             </a:r>
           </a:p>
@@ -2623,7 +2604,7 @@
           <a:p>
             <a:fld id="{78C97017-6FC3-485B-9764-EAC9E56C1D49}" type="datetimeFigureOut">
               <a:rPr lang="en-US" smtClean="0"/>
-              <a:t>1/1/18</a:t>
+              <a:t>4/14/2018</a:t>
             </a:fld>
             <a:endParaRPr lang="en-US"/>
           </a:p>
@@ -2726,10 +2707,9 @@
           </a:lstStyle>
           <a:p>
             <a:r>
-              <a:rPr lang="en-US" smtClean="0"/>
+              <a:rPr lang="en-US"/>
               <a:t>Click to edit Master title style</a:t>
             </a:r>
-            <a:endParaRPr lang="en-US"/>
           </a:p>
         </p:txBody>
       </p:sp>
@@ -2853,7 +2833,7 @@
           <a:p>
             <a:pPr lvl="0"/>
             <a:r>
-              <a:rPr lang="en-US" smtClean="0"/>
+              <a:rPr lang="en-US"/>
               <a:t>Click to edit Master text styles</a:t>
             </a:r>
           </a:p>
@@ -2876,7 +2856,7 @@
           <a:p>
             <a:fld id="{78C97017-6FC3-485B-9764-EAC9E56C1D49}" type="datetimeFigureOut">
               <a:rPr lang="en-US" smtClean="0"/>
-              <a:t>1/1/18</a:t>
+              <a:t>4/14/2018</a:t>
             </a:fld>
             <a:endParaRPr lang="en-US"/>
           </a:p>
@@ -2985,10 +2965,9 @@
           <a:lstStyle/>
           <a:p>
             <a:r>
-              <a:rPr lang="en-US" smtClean="0"/>
+              <a:rPr lang="en-US"/>
               <a:t>Click to edit Master title style</a:t>
             </a:r>
-            <a:endParaRPr lang="en-US"/>
           </a:p>
         </p:txBody>
       </p:sp>
@@ -3019,38 +2998,37 @@
           <a:p>
             <a:pPr lvl="0"/>
             <a:r>
-              <a:rPr lang="en-US" smtClean="0"/>
+              <a:rPr lang="en-US"/>
               <a:t>Click to edit Master text styles</a:t>
             </a:r>
           </a:p>
           <a:p>
             <a:pPr lvl="1"/>
             <a:r>
-              <a:rPr lang="en-US" smtClean="0"/>
+              <a:rPr lang="en-US"/>
               <a:t>Second level</a:t>
             </a:r>
           </a:p>
           <a:p>
             <a:pPr lvl="2"/>
             <a:r>
-              <a:rPr lang="en-US" smtClean="0"/>
+              <a:rPr lang="en-US"/>
               <a:t>Third level</a:t>
             </a:r>
           </a:p>
           <a:p>
             <a:pPr lvl="3"/>
             <a:r>
-              <a:rPr lang="en-US" smtClean="0"/>
+              <a:rPr lang="en-US"/>
               <a:t>Fourth level</a:t>
             </a:r>
           </a:p>
           <a:p>
             <a:pPr lvl="4"/>
             <a:r>
-              <a:rPr lang="en-US" smtClean="0"/>
+              <a:rPr lang="en-US"/>
               <a:t>Fifth level</a:t>
             </a:r>
-            <a:endParaRPr lang="en-US"/>
           </a:p>
         </p:txBody>
       </p:sp>
@@ -3089,7 +3067,7 @@
           <a:p>
             <a:fld id="{78C97017-6FC3-485B-9764-EAC9E56C1D49}" type="datetimeFigureOut">
               <a:rPr lang="en-US" smtClean="0"/>
-              <a:t>1/1/18</a:t>
+              <a:t>4/14/2018</a:t>
             </a:fld>
             <a:endParaRPr lang="en-US"/>
           </a:p>
@@ -3472,8 +3450,8 @@
         </p:nvSpPr>
         <p:spPr>
           <a:xfrm>
-            <a:off x="1119865" y="1727200"/>
-            <a:ext cx="7490735" cy="2997200"/>
+            <a:off x="1006676" y="1727200"/>
+            <a:ext cx="7490735" cy="3273557"/>
           </a:xfrm>
           <a:prstGeom prst="roundRect">
             <a:avLst>
@@ -3510,7 +3488,7 @@
           <a:lstStyle/>
           <a:p>
             <a:r>
-              <a:rPr lang="en-US" sz="1200" b="1" dirty="0" smtClean="0">
+              <a:rPr lang="en-US" sz="1200" b="1" dirty="0">
                 <a:solidFill>
                   <a:srgbClr val="7030A0"/>
                 </a:solidFill>
@@ -3569,7 +3547,7 @@
           <a:p>
             <a:pPr algn="ctr"/>
             <a:r>
-              <a:rPr lang="en-US" sz="1050" dirty="0" err="1" smtClean="0">
+              <a:rPr lang="en-US" sz="1050" dirty="0" err="1">
                 <a:solidFill>
                   <a:schemeClr val="bg1"/>
                 </a:solidFill>
@@ -3592,7 +3570,7 @@
         </p:nvSpPr>
         <p:spPr>
           <a:xfrm rot="16200000">
-            <a:off x="1683963" y="2868687"/>
+            <a:off x="1516407" y="2867825"/>
             <a:ext cx="1093635" cy="346760"/>
           </a:xfrm>
           <a:prstGeom prst="rect">
@@ -3628,7 +3606,7 @@
           <a:p>
             <a:pPr algn="ctr"/>
             <a:r>
-              <a:rPr lang="en-US" sz="1050" dirty="0" err="1" smtClean="0">
+              <a:rPr lang="en-US" sz="1050" dirty="0" err="1">
                 <a:solidFill>
                   <a:schemeClr val="bg1"/>
                 </a:solidFill>
@@ -3647,19 +3625,20 @@
         <p:nvCxnSpPr>
           <p:cNvPr id="107" name="Elbow Connector 106"/>
           <p:cNvCxnSpPr>
-            <a:stCxn id="9" idx="1"/>
+            <a:cxnSpLocks/>
+            <a:stCxn id="9" idx="3"/>
+            <a:endCxn id="62" idx="0"/>
           </p:cNvCxnSpPr>
           <p:nvPr/>
         </p:nvCxnSpPr>
         <p:spPr>
-          <a:xfrm rot="5400000" flipH="1" flipV="1">
-            <a:off x="4360065" y="1080909"/>
-            <a:ext cx="378691" cy="4637261"/>
-          </a:xfrm>
-          <a:prstGeom prst="bentConnector4">
+          <a:xfrm rot="16200000" flipH="1">
+            <a:off x="4183658" y="373954"/>
+            <a:ext cx="363678" cy="4604546"/>
+          </a:xfrm>
+          <a:prstGeom prst="bentConnector3">
             <a:avLst>
-              <a:gd name="adj1" fmla="val -101829"/>
-              <a:gd name="adj2" fmla="val 99976"/>
+              <a:gd name="adj1" fmla="val -196330"/>
             </a:avLst>
           </a:prstGeom>
           <a:ln w="19050">
@@ -3742,7 +3721,7 @@
           <a:p>
             <a:pPr algn="ctr"/>
             <a:r>
-              <a:rPr lang="en-US" sz="1050" dirty="0" smtClean="0">
+              <a:rPr lang="en-US" sz="1050" dirty="0">
                 <a:solidFill>
                   <a:schemeClr val="bg1"/>
                 </a:solidFill>
@@ -3815,8 +3794,8 @@
         </p:nvCxnSpPr>
         <p:spPr>
           <a:xfrm>
-            <a:off x="2656370" y="3326536"/>
-            <a:ext cx="220810" cy="5284"/>
+            <a:off x="2445848" y="3326536"/>
+            <a:ext cx="431332" cy="5284"/>
           </a:xfrm>
           <a:prstGeom prst="straightConnector1">
             <a:avLst/>
@@ -3937,7 +3916,7 @@
         </p:nvSpPr>
         <p:spPr>
           <a:xfrm>
-            <a:off x="2420322" y="3239846"/>
+            <a:off x="2209800" y="3239846"/>
             <a:ext cx="236048" cy="173380"/>
           </a:xfrm>
           <a:prstGeom prst="flowChartDecision">
@@ -4015,7 +3994,7 @@
           <a:p>
             <a:pPr algn="ctr"/>
             <a:r>
-              <a:rPr lang="en-US" sz="1050" dirty="0" err="1" smtClean="0">
+              <a:rPr lang="en-US" sz="1050" dirty="0" err="1">
                 <a:solidFill>
                   <a:srgbClr val="7030A0"/>
                 </a:solidFill>
@@ -4034,15 +4013,15 @@
         <p:nvCxnSpPr>
           <p:cNvPr id="47" name="Straight Arrow Connector 46"/>
           <p:cNvCxnSpPr>
+            <a:cxnSpLocks/>
             <a:stCxn id="48" idx="3"/>
-            <a:endCxn id="46" idx="1"/>
           </p:cNvCxnSpPr>
           <p:nvPr/>
         </p:nvCxnSpPr>
         <p:spPr>
           <a:xfrm>
-            <a:off x="2658680" y="2795516"/>
-            <a:ext cx="220810" cy="5284"/>
+            <a:off x="2445848" y="2795516"/>
+            <a:ext cx="449752" cy="5284"/>
           </a:xfrm>
           <a:prstGeom prst="straightConnector1">
             <a:avLst/>
@@ -4079,7 +4058,7 @@
         </p:nvSpPr>
         <p:spPr>
           <a:xfrm>
-            <a:off x="2422632" y="2708826"/>
+            <a:off x="2209800" y="2708826"/>
             <a:ext cx="236048" cy="173380"/>
           </a:xfrm>
           <a:prstGeom prst="flowChartDecision">
@@ -4124,7 +4103,7 @@
         </p:nvSpPr>
         <p:spPr>
           <a:xfrm>
-            <a:off x="4487017" y="2847371"/>
+            <a:off x="4481831" y="2853640"/>
             <a:ext cx="1156969" cy="346760"/>
           </a:xfrm>
           <a:prstGeom prst="rect">
@@ -4157,7 +4136,7 @@
           <a:p>
             <a:pPr algn="ctr"/>
             <a:r>
-              <a:rPr lang="en-US" sz="1050" dirty="0" err="1" smtClean="0">
+              <a:rPr lang="en-US" sz="1050" dirty="0" err="1">
                 <a:solidFill>
                   <a:srgbClr val="7030A0"/>
                 </a:solidFill>
@@ -4231,7 +4210,7 @@
         <p:spPr>
           <a:xfrm>
             <a:off x="4220351" y="2760681"/>
-            <a:ext cx="266666" cy="260070"/>
+            <a:ext cx="261480" cy="266339"/>
           </a:xfrm>
           <a:prstGeom prst="bentConnector3">
             <a:avLst/>
@@ -4301,7 +4280,7 @@
           <a:p>
             <a:pPr algn="ctr"/>
             <a:r>
-              <a:rPr lang="en-US" sz="1050" dirty="0" err="1" smtClean="0">
+              <a:rPr lang="en-US" sz="1050" dirty="0" err="1">
                 <a:solidFill>
                   <a:srgbClr val="7030A0"/>
                 </a:solidFill>
@@ -4400,7 +4379,7 @@
           <a:p>
             <a:pPr algn="ctr"/>
             <a:r>
-              <a:rPr lang="en-US" sz="1050" dirty="0" smtClean="0">
+              <a:rPr lang="en-US" sz="1050" dirty="0">
                 <a:solidFill>
                   <a:srgbClr val="7030A0"/>
                 </a:solidFill>
@@ -4542,7 +4521,7 @@
           <a:p>
             <a:pPr algn="ctr"/>
             <a:r>
-              <a:rPr lang="en-US" sz="1050" dirty="0" smtClean="0">
+              <a:rPr lang="en-US" sz="1050" dirty="0">
                 <a:solidFill>
                   <a:srgbClr val="7030A0"/>
                 </a:solidFill>
@@ -4651,7 +4630,7 @@
         </p:nvSpPr>
         <p:spPr>
           <a:xfrm>
-            <a:off x="7712397" y="2564238"/>
+            <a:off x="7712397" y="1924017"/>
             <a:ext cx="708186" cy="285783"/>
           </a:xfrm>
           <a:prstGeom prst="rect">
@@ -4684,7 +4663,7 @@
           <a:p>
             <a:pPr algn="ctr"/>
             <a:r>
-              <a:rPr lang="en-US" sz="1050" dirty="0" smtClean="0">
+              <a:rPr lang="en-US" sz="1050" dirty="0">
                 <a:solidFill>
                   <a:srgbClr val="7030A0"/>
                 </a:solidFill>
@@ -4757,8 +4736,8 @@
         </p:nvCxnSpPr>
         <p:spPr>
           <a:xfrm flipV="1">
-            <a:off x="7277995" y="2707130"/>
-            <a:ext cx="434402" cy="327761"/>
+            <a:off x="7277995" y="2066909"/>
+            <a:ext cx="434402" cy="967982"/>
           </a:xfrm>
           <a:prstGeom prst="bentConnector3">
             <a:avLst/>
@@ -4795,7 +4774,7 @@
         </p:nvSpPr>
         <p:spPr>
           <a:xfrm>
-            <a:off x="7712397" y="2887216"/>
+            <a:off x="7712397" y="2305017"/>
             <a:ext cx="708186" cy="285783"/>
           </a:xfrm>
           <a:prstGeom prst="rect">
@@ -4828,7 +4807,7 @@
           <a:p>
             <a:pPr algn="ctr"/>
             <a:r>
-              <a:rPr lang="en-US" sz="1050" dirty="0" smtClean="0">
+              <a:rPr lang="en-US" sz="1050" dirty="0">
                 <a:solidFill>
                   <a:srgbClr val="7030A0"/>
                 </a:solidFill>
@@ -4854,8 +4833,8 @@
         </p:nvCxnSpPr>
         <p:spPr>
           <a:xfrm flipV="1">
-            <a:off x="7277995" y="3030108"/>
-            <a:ext cx="434402" cy="4783"/>
+            <a:off x="7277995" y="2447909"/>
+            <a:ext cx="434402" cy="586982"/>
           </a:xfrm>
           <a:prstGeom prst="bentConnector3">
             <a:avLst/>
@@ -4892,7 +4871,7 @@
         </p:nvSpPr>
         <p:spPr>
           <a:xfrm>
-            <a:off x="7712397" y="3210194"/>
+            <a:off x="7712397" y="2657277"/>
             <a:ext cx="708186" cy="285783"/>
           </a:xfrm>
           <a:prstGeom prst="rect">
@@ -4925,7 +4904,7 @@
           <a:p>
             <a:pPr algn="ctr"/>
             <a:r>
-              <a:rPr lang="en-US" sz="1050" dirty="0" smtClean="0">
+              <a:rPr lang="en-US" sz="1050" dirty="0">
                 <a:solidFill>
                   <a:srgbClr val="7030A0"/>
                 </a:solidFill>
@@ -4950,9 +4929,9 @@
           <p:nvPr/>
         </p:nvCxnSpPr>
         <p:spPr>
-          <a:xfrm>
-            <a:off x="7277995" y="3034891"/>
-            <a:ext cx="434402" cy="318195"/>
+          <a:xfrm flipV="1">
+            <a:off x="7277995" y="2800169"/>
+            <a:ext cx="434402" cy="234722"/>
           </a:xfrm>
           <a:prstGeom prst="bentConnector3">
             <a:avLst/>
@@ -4989,7 +4968,7 @@
         </p:nvSpPr>
         <p:spPr>
           <a:xfrm>
-            <a:off x="7712397" y="3533171"/>
+            <a:off x="7712397" y="2990817"/>
             <a:ext cx="708186" cy="285783"/>
           </a:xfrm>
           <a:prstGeom prst="rect">
@@ -5022,7 +5001,7 @@
           <a:p>
             <a:pPr algn="ctr"/>
             <a:r>
-              <a:rPr lang="en-US" sz="1050" dirty="0" smtClean="0">
+              <a:rPr lang="en-US" sz="1050" dirty="0">
                 <a:solidFill>
                   <a:srgbClr val="7030A0"/>
                 </a:solidFill>
@@ -5049,7 +5028,7 @@
         <p:spPr>
           <a:xfrm>
             <a:off x="7277995" y="3034891"/>
-            <a:ext cx="434402" cy="641172"/>
+            <a:ext cx="434402" cy="98818"/>
           </a:xfrm>
           <a:prstGeom prst="bentConnector3">
             <a:avLst/>
@@ -5210,7 +5189,7 @@
           <a:p>
             <a:pPr algn="ctr"/>
             <a:r>
-              <a:rPr lang="en-US" sz="1050" dirty="0" smtClean="0">
+              <a:rPr lang="en-US" sz="1050" dirty="0">
                 <a:solidFill>
                   <a:srgbClr val="7030A0"/>
                 </a:solidFill>
@@ -5218,14 +5197,14 @@
               <a:t>&lt;&lt;interface&gt;&gt;</a:t>
             </a:r>
             <a:br>
-              <a:rPr lang="en-US" sz="1050" dirty="0" smtClean="0">
+              <a:rPr lang="en-US" sz="1050" dirty="0">
                 <a:solidFill>
                   <a:srgbClr val="7030A0"/>
                 </a:solidFill>
               </a:rPr>
             </a:br>
             <a:r>
-              <a:rPr lang="en-US" sz="1050" dirty="0" err="1" smtClean="0">
+              <a:rPr lang="en-US" sz="1050" dirty="0" err="1">
                 <a:solidFill>
                   <a:srgbClr val="7030A0"/>
                 </a:solidFill>
@@ -5248,7 +5227,7 @@
         </p:nvSpPr>
         <p:spPr>
           <a:xfrm rot="16200000">
-            <a:off x="6527512" y="3586305"/>
+            <a:off x="6339111" y="2317103"/>
             <a:ext cx="881018" cy="261610"/>
           </a:xfrm>
           <a:prstGeom prst="rect">
@@ -5264,7 +5243,7 @@
           <a:p>
             <a:pPr algn="r"/>
             <a:r>
-              <a:rPr lang="en-US" sz="1100" dirty="0" smtClean="0">
+              <a:rPr lang="en-US" sz="1100" dirty="0">
                 <a:solidFill>
                   <a:srgbClr val="7030A0"/>
                 </a:solidFill>
@@ -5287,7 +5266,7 @@
         </p:nvSpPr>
         <p:spPr>
           <a:xfrm>
-            <a:off x="2057401" y="4239491"/>
+            <a:off x="2327824" y="4415732"/>
             <a:ext cx="1066800" cy="346760"/>
           </a:xfrm>
           <a:prstGeom prst="rect">
@@ -5320,20 +5299,12 @@
           <a:p>
             <a:pPr algn="ctr"/>
             <a:r>
-              <a:rPr lang="en-US" sz="1050" dirty="0" smtClean="0">
+              <a:rPr lang="en-US" sz="1050" dirty="0">
                 <a:solidFill>
                   <a:srgbClr val="7030A0"/>
                 </a:solidFill>
               </a:rPr>
               <a:t>&lt;&lt;interface&gt;&gt;</a:t>
-            </a:r>
-            <a:r>
-              <a:rPr lang="en-US" sz="1050">
-                <a:solidFill>
-                  <a:srgbClr val="7030A0"/>
-                </a:solidFill>
-              </a:rPr>
-              <a:t/>
             </a:r>
             <a:br>
               <a:rPr lang="en-US" sz="1050">
@@ -5343,7 +5314,7 @@
               </a:rPr>
             </a:br>
             <a:r>
-              <a:rPr lang="en-US" sz="1050" dirty="0" err="1" smtClean="0">
+              <a:rPr lang="en-US" sz="1050" dirty="0" err="1">
                 <a:solidFill>
                   <a:srgbClr val="7030A0"/>
                 </a:solidFill>
@@ -5369,8 +5340,8 @@
         </p:nvCxnSpPr>
         <p:spPr>
           <a:xfrm rot="16200000" flipH="1">
-            <a:off x="1364475" y="3719944"/>
-            <a:ext cx="831471" cy="554381"/>
+            <a:off x="1411566" y="3672854"/>
+            <a:ext cx="1007712" cy="824804"/>
           </a:xfrm>
           <a:prstGeom prst="bentConnector2">
             <a:avLst/>
@@ -5404,18 +5375,20 @@
         <p:nvCxnSpPr>
           <p:cNvPr id="50" name="Elbow Connector 49"/>
           <p:cNvCxnSpPr>
-            <a:stCxn id="62" idx="0"/>
+            <a:cxnSpLocks/>
             <a:endCxn id="57" idx="3"/>
           </p:cNvCxnSpPr>
           <p:nvPr/>
         </p:nvCxnSpPr>
         <p:spPr>
-          <a:xfrm rot="16200000" flipV="1">
-            <a:off x="5948976" y="2139271"/>
-            <a:ext cx="404117" cy="1033473"/>
-          </a:xfrm>
-          <a:prstGeom prst="bentConnector2">
-            <a:avLst/>
+          <a:xfrm rot="10800000">
+            <a:off x="5634298" y="2453949"/>
+            <a:ext cx="758385" cy="413230"/>
+          </a:xfrm>
+          <a:prstGeom prst="bentConnector3">
+            <a:avLst>
+              <a:gd name="adj1" fmla="val -443"/>
+            </a:avLst>
           </a:prstGeom>
           <a:ln w="19050">
             <a:solidFill>
@@ -5465,7 +5438,7 @@
           <a:p>
             <a:pPr algn="ctr"/>
             <a:r>
-              <a:rPr lang="en-US" sz="1100" dirty="0" smtClean="0">
+              <a:rPr lang="en-US" sz="1100" dirty="0">
                 <a:solidFill>
                   <a:srgbClr val="7030A0"/>
                 </a:solidFill>
@@ -5504,7 +5477,7 @@
           <a:p>
             <a:pPr algn="ctr"/>
             <a:r>
-              <a:rPr lang="en-US" sz="1100" dirty="0" smtClean="0">
+              <a:rPr lang="en-US" sz="1100" dirty="0">
                 <a:solidFill>
                   <a:srgbClr val="7030A0"/>
                 </a:solidFill>
@@ -5543,7 +5516,7 @@
           <a:p>
             <a:pPr algn="ctr"/>
             <a:r>
-              <a:rPr lang="en-US" sz="1100" dirty="0" smtClean="0">
+              <a:rPr lang="en-US" sz="1100" dirty="0">
                 <a:solidFill>
                   <a:srgbClr val="7030A0"/>
                 </a:solidFill>
@@ -5582,7 +5555,7 @@
           <a:p>
             <a:pPr algn="ctr"/>
             <a:r>
-              <a:rPr lang="en-US" sz="1100" dirty="0" smtClean="0">
+              <a:rPr lang="en-US" sz="1100" dirty="0">
                 <a:solidFill>
                   <a:srgbClr val="7030A0"/>
                 </a:solidFill>
@@ -5621,7 +5594,7 @@
           <a:p>
             <a:pPr algn="ctr"/>
             <a:r>
-              <a:rPr lang="en-US" sz="1100" dirty="0" smtClean="0">
+              <a:rPr lang="en-US" sz="1100" dirty="0">
                 <a:solidFill>
                   <a:srgbClr val="7030A0"/>
                 </a:solidFill>
@@ -5660,7 +5633,7 @@
           <a:p>
             <a:pPr algn="ctr"/>
             <a:r>
-              <a:rPr lang="en-US" sz="1100" dirty="0" smtClean="0">
+              <a:rPr lang="en-US" sz="1100" dirty="0">
                 <a:solidFill>
                   <a:srgbClr val="7030A0"/>
                 </a:solidFill>
@@ -5699,7 +5672,7 @@
           <a:p>
             <a:pPr algn="ctr"/>
             <a:r>
-              <a:rPr lang="en-US" sz="1100" dirty="0" smtClean="0">
+              <a:rPr lang="en-US" sz="1100" dirty="0">
                 <a:solidFill>
                   <a:srgbClr val="7030A0"/>
                 </a:solidFill>
@@ -5738,7 +5711,7 @@
           <a:p>
             <a:pPr algn="ctr"/>
             <a:r>
-              <a:rPr lang="en-US" sz="1100" dirty="0" smtClean="0">
+              <a:rPr lang="en-US" sz="1100" dirty="0">
                 <a:solidFill>
                   <a:srgbClr val="7030A0"/>
                 </a:solidFill>
@@ -5753,6 +5726,871 @@
           </a:p>
         </p:txBody>
       </p:sp>
+      <p:sp>
+        <p:nvSpPr>
+          <p:cNvPr id="53" name="Rectangle 8">
+            <a:extLst>
+              <a:ext uri="{FF2B5EF4-FFF2-40B4-BE49-F238E27FC236}">
+                <a16:creationId xmlns:a16="http://schemas.microsoft.com/office/drawing/2014/main" id="{777C7B80-BD17-4BC9-B6B8-897B29553936}"/>
+              </a:ext>
+            </a:extLst>
+          </p:cNvPr>
+          <p:cNvSpPr/>
+          <p:nvPr/>
+        </p:nvSpPr>
+        <p:spPr>
+          <a:xfrm>
+            <a:off x="4481993" y="4149040"/>
+            <a:ext cx="1156969" cy="346760"/>
+          </a:xfrm>
+          <a:prstGeom prst="rect">
+            <a:avLst/>
+          </a:prstGeom>
+          <a:ln w="19050">
+            <a:solidFill>
+              <a:srgbClr val="7030A0"/>
+            </a:solidFill>
+          </a:ln>
+          <a:effectLst/>
+        </p:spPr>
+        <p:style>
+          <a:lnRef idx="1">
+            <a:schemeClr val="accent4"/>
+          </a:lnRef>
+          <a:fillRef idx="2">
+            <a:schemeClr val="accent4"/>
+          </a:fillRef>
+          <a:effectRef idx="1">
+            <a:schemeClr val="accent4"/>
+          </a:effectRef>
+          <a:fontRef idx="minor">
+            <a:schemeClr val="dk1"/>
+          </a:fontRef>
+        </p:style>
+        <p:txBody>
+          <a:bodyPr rtlCol="0" anchor="ctr"/>
+          <a:lstStyle/>
+          <a:p>
+            <a:pPr algn="ctr"/>
+            <a:r>
+              <a:rPr lang="en-US" sz="1050" dirty="0" err="1">
+                <a:solidFill>
+                  <a:srgbClr val="7030A0"/>
+                </a:solidFill>
+              </a:rPr>
+              <a:t>UniqueJobList</a:t>
+            </a:r>
+            <a:endParaRPr lang="en-SG" sz="1050" dirty="0">
+              <a:solidFill>
+                <a:srgbClr val="7030A0"/>
+              </a:solidFill>
+            </a:endParaRPr>
+          </a:p>
+        </p:txBody>
+      </p:sp>
+      <p:sp>
+        <p:nvSpPr>
+          <p:cNvPr id="55" name="Rectangle 8">
+            <a:extLst>
+              <a:ext uri="{FF2B5EF4-FFF2-40B4-BE49-F238E27FC236}">
+                <a16:creationId xmlns:a16="http://schemas.microsoft.com/office/drawing/2014/main" id="{D4D3591D-0B54-4D4E-A64E-7872C741AA5E}"/>
+              </a:ext>
+            </a:extLst>
+          </p:cNvPr>
+          <p:cNvSpPr/>
+          <p:nvPr/>
+        </p:nvSpPr>
+        <p:spPr>
+          <a:xfrm>
+            <a:off x="6283298" y="4104310"/>
+            <a:ext cx="708186" cy="346760"/>
+          </a:xfrm>
+          <a:prstGeom prst="rect">
+            <a:avLst/>
+          </a:prstGeom>
+          <a:ln w="19050">
+            <a:solidFill>
+              <a:srgbClr val="7030A0"/>
+            </a:solidFill>
+          </a:ln>
+          <a:effectLst/>
+        </p:spPr>
+        <p:style>
+          <a:lnRef idx="1">
+            <a:schemeClr val="accent4"/>
+          </a:lnRef>
+          <a:fillRef idx="2">
+            <a:schemeClr val="accent4"/>
+          </a:fillRef>
+          <a:effectRef idx="1">
+            <a:schemeClr val="accent4"/>
+          </a:effectRef>
+          <a:fontRef idx="minor">
+            <a:schemeClr val="dk1"/>
+          </a:fontRef>
+        </p:style>
+        <p:txBody>
+          <a:bodyPr rtlCol="0" anchor="ctr"/>
+          <a:lstStyle/>
+          <a:p>
+            <a:pPr algn="ctr"/>
+            <a:r>
+              <a:rPr lang="en-US" sz="1050" dirty="0">
+                <a:solidFill>
+                  <a:srgbClr val="7030A0"/>
+                </a:solidFill>
+              </a:rPr>
+              <a:t>Job</a:t>
+            </a:r>
+            <a:endParaRPr lang="en-SG" sz="1050" dirty="0">
+              <a:solidFill>
+                <a:srgbClr val="7030A0"/>
+              </a:solidFill>
+            </a:endParaRPr>
+          </a:p>
+        </p:txBody>
+      </p:sp>
+      <p:sp>
+        <p:nvSpPr>
+          <p:cNvPr id="71" name="Flowchart: Decision 96">
+            <a:extLst>
+              <a:ext uri="{FF2B5EF4-FFF2-40B4-BE49-F238E27FC236}">
+                <a16:creationId xmlns:a16="http://schemas.microsoft.com/office/drawing/2014/main" id="{269CBBFE-7F3C-411E-A9A8-EBED4C6E49DD}"/>
+              </a:ext>
+            </a:extLst>
+          </p:cNvPr>
+          <p:cNvSpPr/>
+          <p:nvPr/>
+        </p:nvSpPr>
+        <p:spPr>
+          <a:xfrm>
+            <a:off x="5638203" y="4191000"/>
+            <a:ext cx="236048" cy="173380"/>
+          </a:xfrm>
+          <a:prstGeom prst="flowChartDecision">
+            <a:avLst/>
+          </a:prstGeom>
+          <a:noFill/>
+          <a:ln w="19050">
+            <a:solidFill>
+              <a:srgbClr val="7030A0"/>
+            </a:solidFill>
+          </a:ln>
+          <a:effectLst/>
+        </p:spPr>
+        <p:style>
+          <a:lnRef idx="1">
+            <a:schemeClr val="accent6"/>
+          </a:lnRef>
+          <a:fillRef idx="2">
+            <a:schemeClr val="accent6"/>
+          </a:fillRef>
+          <a:effectRef idx="1">
+            <a:schemeClr val="accent6"/>
+          </a:effectRef>
+          <a:fontRef idx="minor">
+            <a:schemeClr val="dk1"/>
+          </a:fontRef>
+        </p:style>
+        <p:txBody>
+          <a:bodyPr rtlCol="0" anchor="ctr"/>
+          <a:lstStyle/>
+          <a:p>
+            <a:pPr algn="ctr"/>
+            <a:endParaRPr lang="en-US" sz="1050"/>
+          </a:p>
+        </p:txBody>
+      </p:sp>
+      <p:cxnSp>
+        <p:nvCxnSpPr>
+          <p:cNvPr id="72" name="Elbow Connector 63">
+            <a:extLst>
+              <a:ext uri="{FF2B5EF4-FFF2-40B4-BE49-F238E27FC236}">
+                <a16:creationId xmlns:a16="http://schemas.microsoft.com/office/drawing/2014/main" id="{0956B9D4-8063-4BC7-B50E-239E5D60FB16}"/>
+              </a:ext>
+            </a:extLst>
+          </p:cNvPr>
+          <p:cNvCxnSpPr>
+            <a:stCxn id="71" idx="3"/>
+            <a:endCxn id="55" idx="1"/>
+          </p:cNvCxnSpPr>
+          <p:nvPr/>
+        </p:nvCxnSpPr>
+        <p:spPr>
+          <a:xfrm>
+            <a:off x="5874251" y="4277690"/>
+            <a:ext cx="409047" cy="12700"/>
+          </a:xfrm>
+          <a:prstGeom prst="bentConnector3">
+            <a:avLst>
+              <a:gd name="adj1" fmla="val -2464"/>
+            </a:avLst>
+          </a:prstGeom>
+          <a:ln w="19050">
+            <a:solidFill>
+              <a:srgbClr val="7030A0"/>
+            </a:solidFill>
+            <a:headEnd type="none" w="med" len="med"/>
+            <a:tailEnd type="arrow" w="med" len="med"/>
+          </a:ln>
+          <a:effectLst/>
+        </p:spPr>
+        <p:style>
+          <a:lnRef idx="1">
+            <a:schemeClr val="accent2"/>
+          </a:lnRef>
+          <a:fillRef idx="2">
+            <a:schemeClr val="accent2"/>
+          </a:fillRef>
+          <a:effectRef idx="1">
+            <a:schemeClr val="accent2"/>
+          </a:effectRef>
+          <a:fontRef idx="minor">
+            <a:schemeClr val="dk1"/>
+          </a:fontRef>
+        </p:style>
+      </p:cxnSp>
+      <p:sp>
+        <p:nvSpPr>
+          <p:cNvPr id="73" name="Rectangle 8">
+            <a:extLst>
+              <a:ext uri="{FF2B5EF4-FFF2-40B4-BE49-F238E27FC236}">
+                <a16:creationId xmlns:a16="http://schemas.microsoft.com/office/drawing/2014/main" id="{81506480-F0E9-43BC-B7BE-87E07B254375}"/>
+              </a:ext>
+            </a:extLst>
+          </p:cNvPr>
+          <p:cNvSpPr/>
+          <p:nvPr/>
+        </p:nvSpPr>
+        <p:spPr>
+          <a:xfrm>
+            <a:off x="7712397" y="3831127"/>
+            <a:ext cx="708186" cy="285783"/>
+          </a:xfrm>
+          <a:prstGeom prst="rect">
+            <a:avLst/>
+          </a:prstGeom>
+          <a:ln w="19050">
+            <a:solidFill>
+              <a:srgbClr val="7030A0"/>
+            </a:solidFill>
+          </a:ln>
+          <a:effectLst/>
+        </p:spPr>
+        <p:style>
+          <a:lnRef idx="1">
+            <a:schemeClr val="accent4"/>
+          </a:lnRef>
+          <a:fillRef idx="2">
+            <a:schemeClr val="accent4"/>
+          </a:fillRef>
+          <a:effectRef idx="1">
+            <a:schemeClr val="accent4"/>
+          </a:effectRef>
+          <a:fontRef idx="minor">
+            <a:schemeClr val="dk1"/>
+          </a:fontRef>
+        </p:style>
+        <p:txBody>
+          <a:bodyPr rtlCol="0" anchor="ctr"/>
+          <a:lstStyle/>
+          <a:p>
+            <a:pPr algn="ctr"/>
+            <a:r>
+              <a:rPr lang="en-US" sz="1050" dirty="0" err="1">
+                <a:solidFill>
+                  <a:srgbClr val="7030A0"/>
+                </a:solidFill>
+              </a:rPr>
+              <a:t>JobTitle</a:t>
+            </a:r>
+            <a:endParaRPr lang="en-SG" sz="1050" dirty="0">
+              <a:solidFill>
+                <a:srgbClr val="7030A0"/>
+              </a:solidFill>
+            </a:endParaRPr>
+          </a:p>
+        </p:txBody>
+      </p:sp>
+      <p:sp>
+        <p:nvSpPr>
+          <p:cNvPr id="74" name="Flowchart: Decision 96">
+            <a:extLst>
+              <a:ext uri="{FF2B5EF4-FFF2-40B4-BE49-F238E27FC236}">
+                <a16:creationId xmlns:a16="http://schemas.microsoft.com/office/drawing/2014/main" id="{01DA3251-B82F-4055-B5CC-08726B6AE79B}"/>
+              </a:ext>
+            </a:extLst>
+          </p:cNvPr>
+          <p:cNvSpPr/>
+          <p:nvPr/>
+        </p:nvSpPr>
+        <p:spPr>
+          <a:xfrm>
+            <a:off x="7036923" y="4246220"/>
+            <a:ext cx="236048" cy="173380"/>
+          </a:xfrm>
+          <a:prstGeom prst="flowChartDecision">
+            <a:avLst/>
+          </a:prstGeom>
+          <a:solidFill>
+            <a:srgbClr val="7030A0"/>
+          </a:solidFill>
+          <a:ln w="19050">
+            <a:solidFill>
+              <a:srgbClr val="7030A0"/>
+            </a:solidFill>
+          </a:ln>
+          <a:effectLst/>
+        </p:spPr>
+        <p:style>
+          <a:lnRef idx="1">
+            <a:schemeClr val="accent6"/>
+          </a:lnRef>
+          <a:fillRef idx="2">
+            <a:schemeClr val="accent6"/>
+          </a:fillRef>
+          <a:effectRef idx="1">
+            <a:schemeClr val="accent6"/>
+          </a:effectRef>
+          <a:fontRef idx="minor">
+            <a:schemeClr val="dk1"/>
+          </a:fontRef>
+        </p:style>
+        <p:txBody>
+          <a:bodyPr rtlCol="0" anchor="ctr"/>
+          <a:lstStyle/>
+          <a:p>
+            <a:pPr algn="ctr"/>
+            <a:endParaRPr lang="en-US" sz="1050"/>
+          </a:p>
+        </p:txBody>
+      </p:sp>
+      <p:cxnSp>
+        <p:nvCxnSpPr>
+          <p:cNvPr id="77" name="Elbow Connector 78">
+            <a:extLst>
+              <a:ext uri="{FF2B5EF4-FFF2-40B4-BE49-F238E27FC236}">
+                <a16:creationId xmlns:a16="http://schemas.microsoft.com/office/drawing/2014/main" id="{94ACB312-0E31-4702-AD28-5B82EFE91784}"/>
+              </a:ext>
+            </a:extLst>
+          </p:cNvPr>
+          <p:cNvCxnSpPr>
+            <a:cxnSpLocks/>
+            <a:stCxn id="74" idx="3"/>
+            <a:endCxn id="73" idx="1"/>
+          </p:cNvCxnSpPr>
+          <p:nvPr/>
+        </p:nvCxnSpPr>
+        <p:spPr>
+          <a:xfrm flipV="1">
+            <a:off x="7272971" y="3974019"/>
+            <a:ext cx="439426" cy="358891"/>
+          </a:xfrm>
+          <a:prstGeom prst="bentConnector3">
+            <a:avLst>
+              <a:gd name="adj1" fmla="val 50000"/>
+            </a:avLst>
+          </a:prstGeom>
+          <a:ln w="19050">
+            <a:solidFill>
+              <a:srgbClr val="7030A0"/>
+            </a:solidFill>
+            <a:headEnd type="none" w="med" len="med"/>
+            <a:tailEnd type="arrow" w="med" len="med"/>
+          </a:ln>
+          <a:effectLst/>
+        </p:spPr>
+        <p:style>
+          <a:lnRef idx="1">
+            <a:schemeClr val="accent2"/>
+          </a:lnRef>
+          <a:fillRef idx="2">
+            <a:schemeClr val="accent2"/>
+          </a:fillRef>
+          <a:effectRef idx="1">
+            <a:schemeClr val="accent2"/>
+          </a:effectRef>
+          <a:fontRef idx="minor">
+            <a:schemeClr val="dk1"/>
+          </a:fontRef>
+        </p:style>
+      </p:cxnSp>
+      <p:sp>
+        <p:nvSpPr>
+          <p:cNvPr id="82" name="Rectangle 8">
+            <a:extLst>
+              <a:ext uri="{FF2B5EF4-FFF2-40B4-BE49-F238E27FC236}">
+                <a16:creationId xmlns:a16="http://schemas.microsoft.com/office/drawing/2014/main" id="{DEB284DE-2F71-4A5E-BAF2-2B02BC7A88D8}"/>
+              </a:ext>
+            </a:extLst>
+          </p:cNvPr>
+          <p:cNvSpPr/>
+          <p:nvPr/>
+        </p:nvSpPr>
+        <p:spPr>
+          <a:xfrm>
+            <a:off x="7714563" y="4514817"/>
+            <a:ext cx="708186" cy="285783"/>
+          </a:xfrm>
+          <a:prstGeom prst="rect">
+            <a:avLst/>
+          </a:prstGeom>
+          <a:ln w="19050">
+            <a:solidFill>
+              <a:srgbClr val="7030A0"/>
+            </a:solidFill>
+          </a:ln>
+          <a:effectLst/>
+        </p:spPr>
+        <p:style>
+          <a:lnRef idx="1">
+            <a:schemeClr val="accent4"/>
+          </a:lnRef>
+          <a:fillRef idx="2">
+            <a:schemeClr val="accent4"/>
+          </a:fillRef>
+          <a:effectRef idx="1">
+            <a:schemeClr val="accent4"/>
+          </a:effectRef>
+          <a:fontRef idx="minor">
+            <a:schemeClr val="dk1"/>
+          </a:fontRef>
+        </p:style>
+        <p:txBody>
+          <a:bodyPr rtlCol="0" anchor="ctr"/>
+          <a:lstStyle/>
+          <a:p>
+            <a:pPr algn="ctr"/>
+            <a:r>
+              <a:rPr lang="en-US" sz="1050" dirty="0">
+                <a:solidFill>
+                  <a:srgbClr val="7030A0"/>
+                </a:solidFill>
+              </a:rPr>
+              <a:t>Skill</a:t>
+            </a:r>
+            <a:endParaRPr lang="en-SG" sz="1050" dirty="0">
+              <a:solidFill>
+                <a:srgbClr val="7030A0"/>
+              </a:solidFill>
+            </a:endParaRPr>
+          </a:p>
+        </p:txBody>
+      </p:sp>
+      <p:cxnSp>
+        <p:nvCxnSpPr>
+          <p:cNvPr id="87" name="Elbow Connector 80">
+            <a:extLst>
+              <a:ext uri="{FF2B5EF4-FFF2-40B4-BE49-F238E27FC236}">
+                <a16:creationId xmlns:a16="http://schemas.microsoft.com/office/drawing/2014/main" id="{DEB97038-90FA-48FE-A304-EBDBB67C4A89}"/>
+              </a:ext>
+            </a:extLst>
+          </p:cNvPr>
+          <p:cNvCxnSpPr>
+            <a:stCxn id="74" idx="3"/>
+            <a:endCxn id="82" idx="1"/>
+          </p:cNvCxnSpPr>
+          <p:nvPr/>
+        </p:nvCxnSpPr>
+        <p:spPr>
+          <a:xfrm>
+            <a:off x="7272971" y="4332910"/>
+            <a:ext cx="441592" cy="324799"/>
+          </a:xfrm>
+          <a:prstGeom prst="bentConnector3">
+            <a:avLst/>
+          </a:prstGeom>
+          <a:ln w="19050">
+            <a:solidFill>
+              <a:srgbClr val="7030A0"/>
+            </a:solidFill>
+            <a:headEnd type="none" w="med" len="med"/>
+            <a:tailEnd type="arrow" w="med" len="med"/>
+          </a:ln>
+          <a:effectLst/>
+        </p:spPr>
+        <p:style>
+          <a:lnRef idx="1">
+            <a:schemeClr val="accent2"/>
+          </a:lnRef>
+          <a:fillRef idx="2">
+            <a:schemeClr val="accent2"/>
+          </a:fillRef>
+          <a:effectRef idx="1">
+            <a:schemeClr val="accent2"/>
+          </a:effectRef>
+          <a:fontRef idx="minor">
+            <a:schemeClr val="dk1"/>
+          </a:fontRef>
+        </p:style>
+      </p:cxnSp>
+      <p:sp>
+        <p:nvSpPr>
+          <p:cNvPr id="88" name="Rectangle 8">
+            <a:extLst>
+              <a:ext uri="{FF2B5EF4-FFF2-40B4-BE49-F238E27FC236}">
+                <a16:creationId xmlns:a16="http://schemas.microsoft.com/office/drawing/2014/main" id="{CDDB9356-5EC5-4C7B-8495-1F44E7370BDE}"/>
+              </a:ext>
+            </a:extLst>
+          </p:cNvPr>
+          <p:cNvSpPr/>
+          <p:nvPr/>
+        </p:nvSpPr>
+        <p:spPr>
+          <a:xfrm>
+            <a:off x="7716092" y="4171769"/>
+            <a:ext cx="708186" cy="285783"/>
+          </a:xfrm>
+          <a:prstGeom prst="rect">
+            <a:avLst/>
+          </a:prstGeom>
+          <a:ln w="19050">
+            <a:solidFill>
+              <a:srgbClr val="7030A0"/>
+            </a:solidFill>
+          </a:ln>
+          <a:effectLst/>
+        </p:spPr>
+        <p:style>
+          <a:lnRef idx="1">
+            <a:schemeClr val="accent4"/>
+          </a:lnRef>
+          <a:fillRef idx="2">
+            <a:schemeClr val="accent4"/>
+          </a:fillRef>
+          <a:effectRef idx="1">
+            <a:schemeClr val="accent4"/>
+          </a:effectRef>
+          <a:fontRef idx="minor">
+            <a:schemeClr val="dk1"/>
+          </a:fontRef>
+        </p:style>
+        <p:txBody>
+          <a:bodyPr rtlCol="0" anchor="ctr"/>
+          <a:lstStyle/>
+          <a:p>
+            <a:pPr algn="ctr"/>
+            <a:r>
+              <a:rPr lang="en-US" sz="1050" dirty="0">
+                <a:solidFill>
+                  <a:srgbClr val="7030A0"/>
+                </a:solidFill>
+              </a:rPr>
+              <a:t>Location</a:t>
+            </a:r>
+            <a:endParaRPr lang="en-SG" sz="1050" dirty="0">
+              <a:solidFill>
+                <a:srgbClr val="7030A0"/>
+              </a:solidFill>
+            </a:endParaRPr>
+          </a:p>
+        </p:txBody>
+      </p:sp>
+      <p:cxnSp>
+        <p:nvCxnSpPr>
+          <p:cNvPr id="89" name="Elbow Connector 83">
+            <a:extLst>
+              <a:ext uri="{FF2B5EF4-FFF2-40B4-BE49-F238E27FC236}">
+                <a16:creationId xmlns:a16="http://schemas.microsoft.com/office/drawing/2014/main" id="{2BFC9CA1-BF6F-479C-ABA9-3621E10D407D}"/>
+              </a:ext>
+            </a:extLst>
+          </p:cNvPr>
+          <p:cNvCxnSpPr>
+            <a:stCxn id="74" idx="3"/>
+            <a:endCxn id="88" idx="1"/>
+          </p:cNvCxnSpPr>
+          <p:nvPr/>
+        </p:nvCxnSpPr>
+        <p:spPr>
+          <a:xfrm flipV="1">
+            <a:off x="7272971" y="4314661"/>
+            <a:ext cx="443121" cy="18249"/>
+          </a:xfrm>
+          <a:prstGeom prst="bentConnector3">
+            <a:avLst/>
+          </a:prstGeom>
+          <a:ln w="19050">
+            <a:solidFill>
+              <a:srgbClr val="7030A0"/>
+            </a:solidFill>
+            <a:headEnd type="none" w="med" len="med"/>
+            <a:tailEnd type="arrow" w="med" len="med"/>
+          </a:ln>
+          <a:effectLst/>
+        </p:spPr>
+        <p:style>
+          <a:lnRef idx="1">
+            <a:schemeClr val="accent2"/>
+          </a:lnRef>
+          <a:fillRef idx="2">
+            <a:schemeClr val="accent2"/>
+          </a:fillRef>
+          <a:effectRef idx="1">
+            <a:schemeClr val="accent2"/>
+          </a:effectRef>
+          <a:fontRef idx="minor">
+            <a:schemeClr val="dk1"/>
+          </a:fontRef>
+        </p:style>
+      </p:cxnSp>
+      <p:sp>
+        <p:nvSpPr>
+          <p:cNvPr id="92" name="Rectangle 8">
+            <a:extLst>
+              <a:ext uri="{FF2B5EF4-FFF2-40B4-BE49-F238E27FC236}">
+                <a16:creationId xmlns:a16="http://schemas.microsoft.com/office/drawing/2014/main" id="{6B3BC84D-E175-45A9-B07D-96A2232D4615}"/>
+              </a:ext>
+            </a:extLst>
+          </p:cNvPr>
+          <p:cNvSpPr/>
+          <p:nvPr/>
+        </p:nvSpPr>
+        <p:spPr>
+          <a:xfrm>
+            <a:off x="7712397" y="3370623"/>
+            <a:ext cx="708186" cy="285783"/>
+          </a:xfrm>
+          <a:prstGeom prst="rect">
+            <a:avLst/>
+          </a:prstGeom>
+          <a:ln w="19050">
+            <a:solidFill>
+              <a:srgbClr val="7030A0"/>
+            </a:solidFill>
+          </a:ln>
+          <a:effectLst/>
+        </p:spPr>
+        <p:style>
+          <a:lnRef idx="1">
+            <a:schemeClr val="accent4"/>
+          </a:lnRef>
+          <a:fillRef idx="2">
+            <a:schemeClr val="accent4"/>
+          </a:fillRef>
+          <a:effectRef idx="1">
+            <a:schemeClr val="accent4"/>
+          </a:effectRef>
+          <a:fontRef idx="minor">
+            <a:schemeClr val="dk1"/>
+          </a:fontRef>
+        </p:style>
+        <p:txBody>
+          <a:bodyPr rtlCol="0" anchor="ctr"/>
+          <a:lstStyle/>
+          <a:p>
+            <a:pPr algn="ctr"/>
+            <a:r>
+              <a:rPr lang="en-US" sz="1050" dirty="0">
+                <a:solidFill>
+                  <a:srgbClr val="7030A0"/>
+                </a:solidFill>
+              </a:rPr>
+              <a:t>Skill</a:t>
+            </a:r>
+            <a:endParaRPr lang="en-SG" sz="1050" dirty="0">
+              <a:solidFill>
+                <a:srgbClr val="7030A0"/>
+              </a:solidFill>
+            </a:endParaRPr>
+          </a:p>
+        </p:txBody>
+      </p:sp>
+      <p:cxnSp>
+        <p:nvCxnSpPr>
+          <p:cNvPr id="93" name="Elbow Connector 85">
+            <a:extLst>
+              <a:ext uri="{FF2B5EF4-FFF2-40B4-BE49-F238E27FC236}">
+                <a16:creationId xmlns:a16="http://schemas.microsoft.com/office/drawing/2014/main" id="{5CBAA130-5794-4AC1-88F7-77F951901204}"/>
+              </a:ext>
+            </a:extLst>
+          </p:cNvPr>
+          <p:cNvCxnSpPr>
+            <a:cxnSpLocks/>
+            <a:stCxn id="78" idx="3"/>
+            <a:endCxn id="92" idx="1"/>
+          </p:cNvCxnSpPr>
+          <p:nvPr/>
+        </p:nvCxnSpPr>
+        <p:spPr>
+          <a:xfrm>
+            <a:off x="7277995" y="3034891"/>
+            <a:ext cx="434402" cy="478624"/>
+          </a:xfrm>
+          <a:prstGeom prst="bentConnector3">
+            <a:avLst>
+              <a:gd name="adj1" fmla="val 50000"/>
+            </a:avLst>
+          </a:prstGeom>
+          <a:ln w="19050">
+            <a:solidFill>
+              <a:srgbClr val="7030A0"/>
+            </a:solidFill>
+            <a:headEnd type="none" w="med" len="med"/>
+            <a:tailEnd type="arrow" w="med" len="med"/>
+          </a:ln>
+          <a:effectLst/>
+        </p:spPr>
+        <p:style>
+          <a:lnRef idx="1">
+            <a:schemeClr val="accent2"/>
+          </a:lnRef>
+          <a:fillRef idx="2">
+            <a:schemeClr val="accent2"/>
+          </a:fillRef>
+          <a:effectRef idx="1">
+            <a:schemeClr val="accent2"/>
+          </a:effectRef>
+          <a:fontRef idx="minor">
+            <a:schemeClr val="dk1"/>
+          </a:fontRef>
+        </p:style>
+      </p:cxnSp>
+      <p:cxnSp>
+        <p:nvCxnSpPr>
+          <p:cNvPr id="94" name="Elbow Connector 29">
+            <a:extLst>
+              <a:ext uri="{FF2B5EF4-FFF2-40B4-BE49-F238E27FC236}">
+                <a16:creationId xmlns:a16="http://schemas.microsoft.com/office/drawing/2014/main" id="{8E48D990-6D2A-4604-B946-516925DF8EB6}"/>
+              </a:ext>
+            </a:extLst>
+          </p:cNvPr>
+          <p:cNvCxnSpPr>
+            <a:cxnSpLocks/>
+            <a:stCxn id="51" idx="3"/>
+            <a:endCxn id="53" idx="1"/>
+          </p:cNvCxnSpPr>
+          <p:nvPr/>
+        </p:nvCxnSpPr>
+        <p:spPr>
+          <a:xfrm>
+            <a:off x="4220351" y="2760681"/>
+            <a:ext cx="261642" cy="1561739"/>
+          </a:xfrm>
+          <a:prstGeom prst="bentConnector3">
+            <a:avLst>
+              <a:gd name="adj1" fmla="val 50000"/>
+            </a:avLst>
+          </a:prstGeom>
+          <a:ln w="19050">
+            <a:solidFill>
+              <a:srgbClr val="7030A0"/>
+            </a:solidFill>
+            <a:headEnd type="none" w="med" len="med"/>
+            <a:tailEnd type="arrow" w="med" len="med"/>
+          </a:ln>
+          <a:effectLst/>
+        </p:spPr>
+        <p:style>
+          <a:lnRef idx="1">
+            <a:schemeClr val="accent2"/>
+          </a:lnRef>
+          <a:fillRef idx="2">
+            <a:schemeClr val="accent2"/>
+          </a:fillRef>
+          <a:effectRef idx="1">
+            <a:schemeClr val="accent2"/>
+          </a:effectRef>
+          <a:fontRef idx="minor">
+            <a:schemeClr val="dk1"/>
+          </a:fontRef>
+        </p:style>
+      </p:cxnSp>
+      <p:sp>
+        <p:nvSpPr>
+          <p:cNvPr id="98" name="TextBox 97">
+            <a:extLst>
+              <a:ext uri="{FF2B5EF4-FFF2-40B4-BE49-F238E27FC236}">
+                <a16:creationId xmlns:a16="http://schemas.microsoft.com/office/drawing/2014/main" id="{8D907E50-47C6-4826-B808-08393CA98B62}"/>
+              </a:ext>
+            </a:extLst>
+          </p:cNvPr>
+          <p:cNvSpPr txBox="1"/>
+          <p:nvPr/>
+        </p:nvSpPr>
+        <p:spPr>
+          <a:xfrm>
+            <a:off x="5749378" y="4663837"/>
+            <a:ext cx="881018" cy="261610"/>
+          </a:xfrm>
+          <a:prstGeom prst="rect">
+            <a:avLst/>
+          </a:prstGeom>
+          <a:noFill/>
+        </p:spPr>
+        <p:txBody>
+          <a:bodyPr wrap="square" rtlCol="0">
+            <a:spAutoFit/>
+          </a:bodyPr>
+          <a:lstStyle/>
+          <a:p>
+            <a:pPr algn="r"/>
+            <a:r>
+              <a:rPr lang="en-US" sz="1100" dirty="0">
+                <a:solidFill>
+                  <a:srgbClr val="7030A0"/>
+                </a:solidFill>
+              </a:rPr>
+              <a:t>filtered list</a:t>
+            </a:r>
+            <a:endParaRPr lang="en-SG" sz="1100" dirty="0">
+              <a:solidFill>
+                <a:srgbClr val="7030A0"/>
+              </a:solidFill>
+            </a:endParaRPr>
+          </a:p>
+        </p:txBody>
+      </p:sp>
+      <p:cxnSp>
+        <p:nvCxnSpPr>
+          <p:cNvPr id="101" name="Elbow Connector 106">
+            <a:extLst>
+              <a:ext uri="{FF2B5EF4-FFF2-40B4-BE49-F238E27FC236}">
+                <a16:creationId xmlns:a16="http://schemas.microsoft.com/office/drawing/2014/main" id="{D058A806-422E-4A13-9400-8C302D713BF9}"/>
+              </a:ext>
+            </a:extLst>
+          </p:cNvPr>
+          <p:cNvCxnSpPr>
+            <a:cxnSpLocks/>
+            <a:stCxn id="9" idx="1"/>
+            <a:endCxn id="55" idx="2"/>
+          </p:cNvCxnSpPr>
+          <p:nvPr/>
+        </p:nvCxnSpPr>
+        <p:spPr>
+          <a:xfrm rot="16200000" flipH="1">
+            <a:off x="3918785" y="1732463"/>
+            <a:ext cx="863047" cy="4574166"/>
+          </a:xfrm>
+          <a:prstGeom prst="bentConnector3">
+            <a:avLst>
+              <a:gd name="adj1" fmla="val 150273"/>
+            </a:avLst>
+          </a:prstGeom>
+          <a:ln w="19050">
+            <a:solidFill>
+              <a:srgbClr val="7030A0"/>
+            </a:solidFill>
+            <a:prstDash val="solid"/>
+            <a:headEnd type="none" w="med" len="med"/>
+            <a:tailEnd type="arrow" w="med" len="med"/>
+          </a:ln>
+          <a:effectLst/>
+        </p:spPr>
+        <p:style>
+          <a:lnRef idx="1">
+            <a:schemeClr val="accent2"/>
+          </a:lnRef>
+          <a:fillRef idx="2">
+            <a:schemeClr val="accent2"/>
+          </a:fillRef>
+          <a:effectRef idx="1">
+            <a:schemeClr val="accent2"/>
+          </a:effectRef>
+          <a:fontRef idx="minor">
+            <a:schemeClr val="dk1"/>
+          </a:fontRef>
+        </p:style>
+      </p:cxnSp>
     </p:spTree>
     <p:extLst>
       <p:ext uri="{BB962C8B-B14F-4D97-AF65-F5344CB8AC3E}">
@@ -5763,13 +6601,6 @@
   <p:clrMapOvr>
     <a:masterClrMapping/>
   </p:clrMapOvr>
-  <p:timing>
-    <p:tnLst>
-      <p:par>
-        <p:cTn id="1" dur="indefinite" restart="never" nodeType="tmRoot"/>
-      </p:par>
-    </p:tnLst>
-  </p:timing>
 </p:sld>
 </file>
 

</xml_diff>